<commit_message>
Changes on exercise , adding diagrams on solutions
</commit_message>
<xml_diff>
--- a/Markov models/Slides/MarkovModelSlides.pptx
+++ b/Markov models/Slides/MarkovModelSlides.pptx
@@ -226,7 +226,7 @@
           <a:p>
             <a:fld id="{80022054-F6B9-B04E-9F80-BE6C2BED9348}" type="datetimeFigureOut">
               <a:rPr lang="en-US" smtClean="0"/>
-              <a:t>1/29/20</a:t>
+              <a:t>2/3/2020</a:t>
             </a:fld>
             <a:endParaRPr lang="en-US"/>
           </a:p>
@@ -3639,7 +3639,7 @@
           <a:p>
             <a:fld id="{DD3575FE-2CC2-2845-A91B-203C440E7198}" type="datetimeFigureOut">
               <a:rPr lang="en-US" smtClean="0"/>
-              <a:t>1/29/20</a:t>
+              <a:t>2/3/2020</a:t>
             </a:fld>
             <a:endParaRPr lang="en-US"/>
           </a:p>
@@ -3972,7 +3972,7 @@
           <a:p>
             <a:fld id="{DD3575FE-2CC2-2845-A91B-203C440E7198}" type="datetimeFigureOut">
               <a:rPr lang="en-US" smtClean="0"/>
-              <a:t>1/29/20</a:t>
+              <a:t>2/3/2020</a:t>
             </a:fld>
             <a:endParaRPr lang="en-US"/>
           </a:p>
@@ -4156,7 +4156,7 @@
           <a:p>
             <a:fld id="{DD3575FE-2CC2-2845-A91B-203C440E7198}" type="datetimeFigureOut">
               <a:rPr lang="en-US" smtClean="0"/>
-              <a:t>1/29/20</a:t>
+              <a:t>2/3/2020</a:t>
             </a:fld>
             <a:endParaRPr lang="en-US"/>
           </a:p>
@@ -4346,7 +4346,7 @@
           <a:p>
             <a:fld id="{DD3575FE-2CC2-2845-A91B-203C440E7198}" type="datetimeFigureOut">
               <a:rPr lang="en-US" smtClean="0"/>
-              <a:t>1/29/20</a:t>
+              <a:t>2/3/2020</a:t>
             </a:fld>
             <a:endParaRPr lang="en-US"/>
           </a:p>
@@ -4498,7 +4498,7 @@
           <a:p>
             <a:fld id="{DD3575FE-2CC2-2845-A91B-203C440E7198}" type="datetimeFigureOut">
               <a:rPr lang="en-US" smtClean="0"/>
-              <a:t>1/29/20</a:t>
+              <a:t>2/3/2020</a:t>
             </a:fld>
             <a:endParaRPr lang="en-US"/>
           </a:p>
@@ -5723,7 +5723,7 @@
           <a:p>
             <a:fld id="{DD3575FE-2CC2-2845-A91B-203C440E7198}" type="datetimeFigureOut">
               <a:rPr lang="en-US" smtClean="0"/>
-              <a:t>1/29/20</a:t>
+              <a:t>2/3/2020</a:t>
             </a:fld>
             <a:endParaRPr lang="en-US"/>
           </a:p>
@@ -5761,7 +5761,7 @@
           <a:noFill/>
           <a:extLst>
             <a:ext uri="{909E8E84-426E-40dd-AFC4-6F175D3DCCD1}">
-              <a14:hiddenFill xmlns="" xmlns:a14="http://schemas.microsoft.com/office/drawing/2010/main">
+              <a14:hiddenFill xmlns:a14="http://schemas.microsoft.com/office/drawing/2010/main" xmlns="">
                 <a:solidFill>
                   <a:srgbClr val="FFFFFF"/>
                 </a:solidFill>
@@ -5802,7 +5802,7 @@
           <a:noFill/>
           <a:extLst>
             <a:ext uri="{909E8E84-426E-40dd-AFC4-6F175D3DCCD1}">
-              <a14:hiddenFill xmlns="" xmlns:a14="http://schemas.microsoft.com/office/drawing/2010/main">
+              <a14:hiddenFill xmlns:a14="http://schemas.microsoft.com/office/drawing/2010/main" xmlns="">
                 <a:solidFill>
                   <a:srgbClr val="FFFFFF"/>
                 </a:solidFill>
@@ -7411,7 +7411,7 @@
           <a:noFill/>
           <a:extLst>
             <a:ext uri="{909E8E84-426E-40dd-AFC4-6F175D3DCCD1}">
-              <a14:hiddenFill xmlns="" xmlns:a14="http://schemas.microsoft.com/office/drawing/2010/main">
+              <a14:hiddenFill xmlns:a14="http://schemas.microsoft.com/office/drawing/2010/main" xmlns="">
                 <a:solidFill>
                   <a:srgbClr val="FFFFFF"/>
                 </a:solidFill>
@@ -7450,7 +7450,7 @@
           <a:noFill/>
           <a:extLst>
             <a:ext uri="{909E8E84-426E-40dd-AFC4-6F175D3DCCD1}">
-              <a14:hiddenFill xmlns="" xmlns:a14="http://schemas.microsoft.com/office/drawing/2010/main">
+              <a14:hiddenFill xmlns:a14="http://schemas.microsoft.com/office/drawing/2010/main" xmlns="">
                 <a:solidFill>
                   <a:srgbClr val="FFFFFF"/>
                 </a:solidFill>
@@ -7545,7 +7545,7 @@
           <a:noFill/>
           <a:extLst>
             <a:ext uri="{909E8E84-426E-40dd-AFC4-6F175D3DCCD1}">
-              <a14:hiddenFill xmlns="" xmlns:a14="http://schemas.microsoft.com/office/drawing/2010/main">
+              <a14:hiddenFill xmlns:a14="http://schemas.microsoft.com/office/drawing/2010/main" xmlns="">
                 <a:solidFill>
                   <a:srgbClr val="FFFFFF"/>
                 </a:solidFill>
@@ -7586,7 +7586,7 @@
           <a:noFill/>
           <a:extLst>
             <a:ext uri="{909E8E84-426E-40dd-AFC4-6F175D3DCCD1}">
-              <a14:hiddenFill xmlns="" xmlns:a14="http://schemas.microsoft.com/office/drawing/2010/main">
+              <a14:hiddenFill xmlns:a14="http://schemas.microsoft.com/office/drawing/2010/main" xmlns="">
                 <a:solidFill>
                   <a:srgbClr val="FFFFFF"/>
                 </a:solidFill>
@@ -7631,14 +7631,14 @@
           <a:effectLst/>
           <a:extLst>
             <a:ext uri="{909E8E84-426E-40dd-AFC4-6F175D3DCCD1}">
-              <a14:hiddenFill xmlns="" xmlns:a14="http://schemas.microsoft.com/office/drawing/2010/main">
+              <a14:hiddenFill xmlns:a14="http://schemas.microsoft.com/office/drawing/2010/main" xmlns="">
                 <a:solidFill>
                   <a:schemeClr val="accent1"/>
                 </a:solidFill>
               </a14:hiddenFill>
             </a:ext>
             <a:ext uri="{91240B29-F687-4f45-9708-019B960494DF}">
-              <a14:hiddenLine xmlns="" xmlns:a14="http://schemas.microsoft.com/office/drawing/2010/main" w="9525">
+              <a14:hiddenLine xmlns:a14="http://schemas.microsoft.com/office/drawing/2010/main" xmlns="" w="9525">
                 <a:solidFill>
                   <a:schemeClr val="tx1"/>
                 </a:solidFill>
@@ -7648,7 +7648,7 @@
               </a14:hiddenLine>
             </a:ext>
             <a:ext uri="{AF507438-7753-43e0-B8FC-AC1667EBCBE1}">
-              <a14:hiddenEffects xmlns="" xmlns:a14="http://schemas.microsoft.com/office/drawing/2010/main">
+              <a14:hiddenEffects xmlns:a14="http://schemas.microsoft.com/office/drawing/2010/main" xmlns="">
                 <a:effectLst>
                   <a:outerShdw dist="35921" dir="2700000" algn="ctr" rotWithShape="0">
                     <a:schemeClr val="bg2"/>
@@ -7695,14 +7695,14 @@
           <a:effectLst/>
           <a:extLst>
             <a:ext uri="{909E8E84-426E-40dd-AFC4-6F175D3DCCD1}">
-              <a14:hiddenFill xmlns="" xmlns:a14="http://schemas.microsoft.com/office/drawing/2010/main">
+              <a14:hiddenFill xmlns:a14="http://schemas.microsoft.com/office/drawing/2010/main" xmlns="">
                 <a:solidFill>
                   <a:schemeClr val="accent1"/>
                 </a:solidFill>
               </a14:hiddenFill>
             </a:ext>
             <a:ext uri="{91240B29-F687-4f45-9708-019B960494DF}">
-              <a14:hiddenLine xmlns="" xmlns:a14="http://schemas.microsoft.com/office/drawing/2010/main" w="9525">
+              <a14:hiddenLine xmlns:a14="http://schemas.microsoft.com/office/drawing/2010/main" xmlns="" w="9525">
                 <a:solidFill>
                   <a:schemeClr val="tx1"/>
                 </a:solidFill>
@@ -7712,7 +7712,7 @@
               </a14:hiddenLine>
             </a:ext>
             <a:ext uri="{AF507438-7753-43e0-B8FC-AC1667EBCBE1}">
-              <a14:hiddenEffects xmlns="" xmlns:a14="http://schemas.microsoft.com/office/drawing/2010/main">
+              <a14:hiddenEffects xmlns:a14="http://schemas.microsoft.com/office/drawing/2010/main" xmlns="">
                 <a:effectLst>
                   <a:outerShdw dist="35921" dir="2700000" algn="ctr" rotWithShape="0">
                     <a:schemeClr val="bg2"/>
@@ -8132,7 +8132,7 @@
           <a:noFill/>
           <a:extLst>
             <a:ext uri="{909E8E84-426E-40dd-AFC4-6F175D3DCCD1}">
-              <a14:hiddenFill xmlns="" xmlns:a14="http://schemas.microsoft.com/office/drawing/2010/main">
+              <a14:hiddenFill xmlns:a14="http://schemas.microsoft.com/office/drawing/2010/main" xmlns="">
                 <a:solidFill>
                   <a:srgbClr val="FFFFFF"/>
                 </a:solidFill>
@@ -8171,7 +8171,7 @@
           <a:noFill/>
           <a:extLst>
             <a:ext uri="{909E8E84-426E-40dd-AFC4-6F175D3DCCD1}">
-              <a14:hiddenFill xmlns="" xmlns:a14="http://schemas.microsoft.com/office/drawing/2010/main">
+              <a14:hiddenFill xmlns:a14="http://schemas.microsoft.com/office/drawing/2010/main" xmlns="">
                 <a:solidFill>
                   <a:srgbClr val="FFFFFF"/>
                 </a:solidFill>
@@ -8393,7 +8393,7 @@
           <a:noFill/>
           <a:extLst>
             <a:ext uri="{909E8E84-426E-40dd-AFC4-6F175D3DCCD1}">
-              <a14:hiddenFill xmlns="" xmlns:a14="http://schemas.microsoft.com/office/drawing/2010/main">
+              <a14:hiddenFill xmlns:a14="http://schemas.microsoft.com/office/drawing/2010/main" xmlns="">
                 <a:solidFill>
                   <a:srgbClr val="FFFFFF"/>
                 </a:solidFill>
@@ -8440,7 +8440,7 @@
           <a:noFill/>
           <a:extLst>
             <a:ext uri="{909E8E84-426E-40dd-AFC4-6F175D3DCCD1}">
-              <a14:hiddenFill xmlns="" xmlns:a14="http://schemas.microsoft.com/office/drawing/2010/main">
+              <a14:hiddenFill xmlns:a14="http://schemas.microsoft.com/office/drawing/2010/main" xmlns="">
                 <a:solidFill>
                   <a:srgbClr val="FFFFFF"/>
                 </a:solidFill>
@@ -8491,14 +8491,14 @@
           <a:effectLst/>
           <a:extLst>
             <a:ext uri="{909E8E84-426E-40dd-AFC4-6F175D3DCCD1}">
-              <a14:hiddenFill xmlns="" xmlns:a14="http://schemas.microsoft.com/office/drawing/2010/main">
+              <a14:hiddenFill xmlns:a14="http://schemas.microsoft.com/office/drawing/2010/main" xmlns="">
                 <a:solidFill>
                   <a:schemeClr val="accent1"/>
                 </a:solidFill>
               </a14:hiddenFill>
             </a:ext>
             <a:ext uri="{91240B29-F687-4f45-9708-019B960494DF}">
-              <a14:hiddenLine xmlns="" xmlns:a14="http://schemas.microsoft.com/office/drawing/2010/main" w="9525">
+              <a14:hiddenLine xmlns:a14="http://schemas.microsoft.com/office/drawing/2010/main" xmlns="" w="9525">
                 <a:solidFill>
                   <a:schemeClr val="tx1"/>
                 </a:solidFill>
@@ -8508,7 +8508,7 @@
               </a14:hiddenLine>
             </a:ext>
             <a:ext uri="{AF507438-7753-43e0-B8FC-AC1667EBCBE1}">
-              <a14:hiddenEffects xmlns="" xmlns:a14="http://schemas.microsoft.com/office/drawing/2010/main">
+              <a14:hiddenEffects xmlns:a14="http://schemas.microsoft.com/office/drawing/2010/main" xmlns="">
                 <a:effectLst>
                   <a:outerShdw dist="35921" dir="2700000" algn="ctr" rotWithShape="0">
                     <a:schemeClr val="bg2"/>
@@ -8561,14 +8561,14 @@
           <a:effectLst/>
           <a:extLst>
             <a:ext uri="{909E8E84-426E-40dd-AFC4-6F175D3DCCD1}">
-              <a14:hiddenFill xmlns="" xmlns:a14="http://schemas.microsoft.com/office/drawing/2010/main">
+              <a14:hiddenFill xmlns:a14="http://schemas.microsoft.com/office/drawing/2010/main" xmlns="">
                 <a:solidFill>
                   <a:schemeClr val="accent1"/>
                 </a:solidFill>
               </a14:hiddenFill>
             </a:ext>
             <a:ext uri="{91240B29-F687-4f45-9708-019B960494DF}">
-              <a14:hiddenLine xmlns="" xmlns:a14="http://schemas.microsoft.com/office/drawing/2010/main" w="9525">
+              <a14:hiddenLine xmlns:a14="http://schemas.microsoft.com/office/drawing/2010/main" xmlns="" w="9525">
                 <a:solidFill>
                   <a:schemeClr val="tx1"/>
                 </a:solidFill>
@@ -8578,7 +8578,7 @@
               </a14:hiddenLine>
             </a:ext>
             <a:ext uri="{AF507438-7753-43e0-B8FC-AC1667EBCBE1}">
-              <a14:hiddenEffects xmlns="" xmlns:a14="http://schemas.microsoft.com/office/drawing/2010/main">
+              <a14:hiddenEffects xmlns:a14="http://schemas.microsoft.com/office/drawing/2010/main" xmlns="">
                 <a:effectLst>
                   <a:outerShdw dist="35921" dir="2700000" algn="ctr" rotWithShape="0">
                     <a:schemeClr val="bg2"/>
@@ -8754,7 +8754,7 @@
           <a:p>
             <a:fld id="{DD3575FE-2CC2-2845-A91B-203C440E7198}" type="datetimeFigureOut">
               <a:rPr lang="en-US" smtClean="0"/>
-              <a:t>1/29/20</a:t>
+              <a:t>2/3/2020</a:t>
             </a:fld>
             <a:endParaRPr lang="en-US"/>
           </a:p>
@@ -9011,7 +9011,7 @@
           <a:p>
             <a:fld id="{DD3575FE-2CC2-2845-A91B-203C440E7198}" type="datetimeFigureOut">
               <a:rPr lang="en-US" smtClean="0"/>
-              <a:t>1/29/20</a:t>
+              <a:t>2/3/2020</a:t>
             </a:fld>
             <a:endParaRPr lang="en-US"/>
           </a:p>
@@ -9315,7 +9315,7 @@
           <a:p>
             <a:fld id="{DD3575FE-2CC2-2845-A91B-203C440E7198}" type="datetimeFigureOut">
               <a:rPr lang="en-US" smtClean="0"/>
-              <a:t>1/29/20</a:t>
+              <a:t>2/3/2020</a:t>
             </a:fld>
             <a:endParaRPr lang="en-US"/>
           </a:p>
@@ -9764,7 +9764,7 @@
           <a:p>
             <a:fld id="{DD3575FE-2CC2-2845-A91B-203C440E7198}" type="datetimeFigureOut">
               <a:rPr lang="en-US" smtClean="0"/>
-              <a:t>1/29/20</a:t>
+              <a:t>2/3/2020</a:t>
             </a:fld>
             <a:endParaRPr lang="en-US"/>
           </a:p>
@@ -9898,7 +9898,7 @@
           <a:p>
             <a:fld id="{DD3575FE-2CC2-2845-A91B-203C440E7198}" type="datetimeFigureOut">
               <a:rPr lang="en-US" smtClean="0"/>
-              <a:t>1/29/20</a:t>
+              <a:t>2/3/2020</a:t>
             </a:fld>
             <a:endParaRPr lang="en-US"/>
           </a:p>
@@ -10004,7 +10004,7 @@
           <a:p>
             <a:fld id="{DD3575FE-2CC2-2845-A91B-203C440E7198}" type="datetimeFigureOut">
               <a:rPr lang="en-US" smtClean="0"/>
-              <a:t>1/29/20</a:t>
+              <a:t>2/3/2020</a:t>
             </a:fld>
             <a:endParaRPr lang="en-US"/>
           </a:p>
@@ -10353,7 +10353,7 @@
           <a:p>
             <a:fld id="{DD3575FE-2CC2-2845-A91B-203C440E7198}" type="datetimeFigureOut">
               <a:rPr lang="en-US" smtClean="0"/>
-              <a:t>1/29/20</a:t>
+              <a:t>2/3/2020</a:t>
             </a:fld>
             <a:endParaRPr lang="en-US"/>
           </a:p>
@@ -24075,14 +24075,14 @@
           </a:ln>
           <a:extLst>
             <a:ext uri="{909E8E84-426E-40dd-AFC4-6F175D3DCCD1}">
-              <a14:hiddenFill xmlns:a14="http://schemas.microsoft.com/office/drawing/2010/main" xmlns="">
+              <a14:hiddenFill xmlns="" xmlns:a14="http://schemas.microsoft.com/office/drawing/2010/main">
                 <a:solidFill>
                   <a:srgbClr val="FFFFFF"/>
                 </a:solidFill>
               </a14:hiddenFill>
             </a:ext>
             <a:ext uri="{91240B29-F687-4f45-9708-019B960494DF}">
-              <a14:hiddenLine xmlns:a14="http://schemas.microsoft.com/office/drawing/2010/main" xmlns="" w="9525">
+              <a14:hiddenLine xmlns="" xmlns:a14="http://schemas.microsoft.com/office/drawing/2010/main" w="9525">
                 <a:solidFill>
                   <a:srgbClr val="000000"/>
                 </a:solidFill>
@@ -24235,7 +24235,7 @@
           </a:ln>
           <a:extLst>
             <a:ext uri="{909E8E84-426E-40dd-AFC4-6F175D3DCCD1}">
-              <a14:hiddenFill xmlns:a14="http://schemas.microsoft.com/office/drawing/2010/main" xmlns="">
+              <a14:hiddenFill xmlns="" xmlns:a14="http://schemas.microsoft.com/office/drawing/2010/main">
                 <a:solidFill>
                   <a:srgbClr val="FFFFFF"/>
                 </a:solidFill>
@@ -24382,7 +24382,7 @@
           </a:ln>
           <a:extLst>
             <a:ext uri="{909E8E84-426E-40dd-AFC4-6F175D3DCCD1}">
-              <a14:hiddenFill xmlns:a14="http://schemas.microsoft.com/office/drawing/2010/main" xmlns="">
+              <a14:hiddenFill xmlns="" xmlns:a14="http://schemas.microsoft.com/office/drawing/2010/main">
                 <a:solidFill>
                   <a:srgbClr val="FFFFFF"/>
                 </a:solidFill>
@@ -24529,7 +24529,7 @@
           </a:ln>
           <a:extLst>
             <a:ext uri="{909E8E84-426E-40dd-AFC4-6F175D3DCCD1}">
-              <a14:hiddenFill xmlns:a14="http://schemas.microsoft.com/office/drawing/2010/main" xmlns="">
+              <a14:hiddenFill xmlns="" xmlns:a14="http://schemas.microsoft.com/office/drawing/2010/main">
                 <a:solidFill>
                   <a:srgbClr val="FFFFFF"/>
                 </a:solidFill>
@@ -24676,7 +24676,7 @@
           </a:ln>
           <a:extLst>
             <a:ext uri="{909E8E84-426E-40dd-AFC4-6F175D3DCCD1}">
-              <a14:hiddenFill xmlns:a14="http://schemas.microsoft.com/office/drawing/2010/main" xmlns="">
+              <a14:hiddenFill xmlns="" xmlns:a14="http://schemas.microsoft.com/office/drawing/2010/main">
                 <a:solidFill>
                   <a:srgbClr val="FFFFFF"/>
                 </a:solidFill>
@@ -24823,7 +24823,7 @@
           </a:ln>
           <a:extLst>
             <a:ext uri="{909E8E84-426E-40dd-AFC4-6F175D3DCCD1}">
-              <a14:hiddenFill xmlns:a14="http://schemas.microsoft.com/office/drawing/2010/main" xmlns="">
+              <a14:hiddenFill xmlns="" xmlns:a14="http://schemas.microsoft.com/office/drawing/2010/main">
                 <a:solidFill>
                   <a:srgbClr val="FFFFFF"/>
                 </a:solidFill>
@@ -24970,7 +24970,7 @@
           </a:ln>
           <a:extLst>
             <a:ext uri="{909E8E84-426E-40dd-AFC4-6F175D3DCCD1}">
-              <a14:hiddenFill xmlns:a14="http://schemas.microsoft.com/office/drawing/2010/main" xmlns="">
+              <a14:hiddenFill xmlns="" xmlns:a14="http://schemas.microsoft.com/office/drawing/2010/main">
                 <a:solidFill>
                   <a:srgbClr val="FFFFFF"/>
                 </a:solidFill>
@@ -25117,7 +25117,7 @@
           </a:ln>
           <a:extLst>
             <a:ext uri="{909E8E84-426E-40dd-AFC4-6F175D3DCCD1}">
-              <a14:hiddenFill xmlns:a14="http://schemas.microsoft.com/office/drawing/2010/main" xmlns="">
+              <a14:hiddenFill xmlns="" xmlns:a14="http://schemas.microsoft.com/office/drawing/2010/main">
                 <a:solidFill>
                   <a:srgbClr val="FFFFFF"/>
                 </a:solidFill>
@@ -25264,7 +25264,7 @@
           </a:ln>
           <a:extLst>
             <a:ext uri="{909E8E84-426E-40dd-AFC4-6F175D3DCCD1}">
-              <a14:hiddenFill xmlns:a14="http://schemas.microsoft.com/office/drawing/2010/main" xmlns="">
+              <a14:hiddenFill xmlns="" xmlns:a14="http://schemas.microsoft.com/office/drawing/2010/main">
                 <a:solidFill>
                   <a:srgbClr val="FFFFFF"/>
                 </a:solidFill>
@@ -25411,7 +25411,7 @@
           </a:ln>
           <a:extLst>
             <a:ext uri="{909E8E84-426E-40dd-AFC4-6F175D3DCCD1}">
-              <a14:hiddenFill xmlns:a14="http://schemas.microsoft.com/office/drawing/2010/main" xmlns="">
+              <a14:hiddenFill xmlns="" xmlns:a14="http://schemas.microsoft.com/office/drawing/2010/main">
                 <a:solidFill>
                   <a:srgbClr val="FFFFFF"/>
                 </a:solidFill>
@@ -25565,7 +25565,7 @@
           </a:ln>
           <a:extLst>
             <a:ext uri="{909E8E84-426E-40dd-AFC4-6F175D3DCCD1}">
-              <a14:hiddenFill xmlns:a14="http://schemas.microsoft.com/office/drawing/2010/main" xmlns="">
+              <a14:hiddenFill xmlns="" xmlns:a14="http://schemas.microsoft.com/office/drawing/2010/main">
                 <a:noFill/>
               </a14:hiddenFill>
             </a:ext>
@@ -25622,7 +25622,7 @@
             </a:ln>
             <a:extLst>
               <a:ext uri="{909E8E84-426E-40dd-AFC4-6F175D3DCCD1}">
-                <a14:hiddenFill xmlns:a14="http://schemas.microsoft.com/office/drawing/2010/main" xmlns="">
+                <a14:hiddenFill xmlns="" xmlns:a14="http://schemas.microsoft.com/office/drawing/2010/main">
                   <a:solidFill>
                     <a:srgbClr val="FFFFFF"/>
                   </a:solidFill>
@@ -25766,7 +25766,7 @@
             </a:ln>
             <a:extLst>
               <a:ext uri="{909E8E84-426E-40dd-AFC4-6F175D3DCCD1}">
-                <a14:hiddenFill xmlns:a14="http://schemas.microsoft.com/office/drawing/2010/main" xmlns="">
+                <a14:hiddenFill xmlns="" xmlns:a14="http://schemas.microsoft.com/office/drawing/2010/main">
                   <a:noFill/>
                 </a14:hiddenFill>
               </a:ext>
@@ -25807,7 +25807,7 @@
             </a:ln>
             <a:extLst>
               <a:ext uri="{909E8E84-426E-40dd-AFC4-6F175D3DCCD1}">
-                <a14:hiddenFill xmlns:a14="http://schemas.microsoft.com/office/drawing/2010/main" xmlns="">
+                <a14:hiddenFill xmlns="" xmlns:a14="http://schemas.microsoft.com/office/drawing/2010/main">
                   <a:noFill/>
                 </a14:hiddenFill>
               </a:ext>
@@ -25848,7 +25848,7 @@
             </a:ln>
             <a:extLst>
               <a:ext uri="{909E8E84-426E-40dd-AFC4-6F175D3DCCD1}">
-                <a14:hiddenFill xmlns:a14="http://schemas.microsoft.com/office/drawing/2010/main" xmlns="">
+                <a14:hiddenFill xmlns="" xmlns:a14="http://schemas.microsoft.com/office/drawing/2010/main">
                   <a:noFill/>
                 </a14:hiddenFill>
               </a:ext>
@@ -25889,7 +25889,7 @@
             </a:ln>
             <a:extLst>
               <a:ext uri="{909E8E84-426E-40dd-AFC4-6F175D3DCCD1}">
-                <a14:hiddenFill xmlns:a14="http://schemas.microsoft.com/office/drawing/2010/main" xmlns="">
+                <a14:hiddenFill xmlns="" xmlns:a14="http://schemas.microsoft.com/office/drawing/2010/main">
                   <a:noFill/>
                 </a14:hiddenFill>
               </a:ext>
@@ -25930,7 +25930,7 @@
             </a:ln>
             <a:extLst>
               <a:ext uri="{909E8E84-426E-40dd-AFC4-6F175D3DCCD1}">
-                <a14:hiddenFill xmlns:a14="http://schemas.microsoft.com/office/drawing/2010/main" xmlns="">
+                <a14:hiddenFill xmlns="" xmlns:a14="http://schemas.microsoft.com/office/drawing/2010/main">
                   <a:noFill/>
                 </a14:hiddenFill>
               </a:ext>
@@ -26299,7 +26299,7 @@
             </a:ln>
             <a:extLst>
               <a:ext uri="{909E8E84-426E-40dd-AFC4-6F175D3DCCD1}">
-                <a14:hiddenFill xmlns:a14="http://schemas.microsoft.com/office/drawing/2010/main" xmlns="">
+                <a14:hiddenFill xmlns="" xmlns:a14="http://schemas.microsoft.com/office/drawing/2010/main">
                   <a:solidFill>
                     <a:srgbClr val="FFFFFF"/>
                   </a:solidFill>
@@ -26338,14 +26338,14 @@
           </a:ln>
           <a:extLst>
             <a:ext uri="{909E8E84-426E-40dd-AFC4-6F175D3DCCD1}">
-              <a14:hiddenFill xmlns:a14="http://schemas.microsoft.com/office/drawing/2010/main" xmlns="">
+              <a14:hiddenFill xmlns="" xmlns:a14="http://schemas.microsoft.com/office/drawing/2010/main">
                 <a:solidFill>
                   <a:srgbClr val="FFFFFF"/>
                 </a:solidFill>
               </a14:hiddenFill>
             </a:ext>
             <a:ext uri="{91240B29-F687-4f45-9708-019B960494DF}">
-              <a14:hiddenLine xmlns:a14="http://schemas.microsoft.com/office/drawing/2010/main" xmlns="" w="9525">
+              <a14:hiddenLine xmlns="" xmlns:a14="http://schemas.microsoft.com/office/drawing/2010/main" w="9525">
                 <a:solidFill>
                   <a:srgbClr val="000000"/>
                 </a:solidFill>
@@ -26500,7 +26500,7 @@
           </a:ln>
           <a:extLst>
             <a:ext uri="{909E8E84-426E-40dd-AFC4-6F175D3DCCD1}">
-              <a14:hiddenFill xmlns:a14="http://schemas.microsoft.com/office/drawing/2010/main" xmlns="">
+              <a14:hiddenFill xmlns="" xmlns:a14="http://schemas.microsoft.com/office/drawing/2010/main">
                 <a:noFill/>
               </a14:hiddenFill>
             </a:ext>
@@ -26536,14 +26536,14 @@
           </a:ln>
           <a:extLst>
             <a:ext uri="{909E8E84-426E-40dd-AFC4-6F175D3DCCD1}">
-              <a14:hiddenFill xmlns:a14="http://schemas.microsoft.com/office/drawing/2010/main" xmlns="">
+              <a14:hiddenFill xmlns="" xmlns:a14="http://schemas.microsoft.com/office/drawing/2010/main">
                 <a:solidFill>
                   <a:srgbClr val="FFFFFF"/>
                 </a:solidFill>
               </a14:hiddenFill>
             </a:ext>
             <a:ext uri="{91240B29-F687-4f45-9708-019B960494DF}">
-              <a14:hiddenLine xmlns:a14="http://schemas.microsoft.com/office/drawing/2010/main" xmlns="" w="9525">
+              <a14:hiddenLine xmlns="" xmlns:a14="http://schemas.microsoft.com/office/drawing/2010/main" w="9525">
                 <a:solidFill>
                   <a:srgbClr val="000000"/>
                 </a:solidFill>
@@ -26698,7 +26698,7 @@
           </a:ln>
           <a:extLst>
             <a:ext uri="{909E8E84-426E-40dd-AFC4-6F175D3DCCD1}">
-              <a14:hiddenFill xmlns:a14="http://schemas.microsoft.com/office/drawing/2010/main" xmlns="">
+              <a14:hiddenFill xmlns="" xmlns:a14="http://schemas.microsoft.com/office/drawing/2010/main">
                 <a:noFill/>
               </a14:hiddenFill>
             </a:ext>
@@ -26734,14 +26734,14 @@
           </a:ln>
           <a:extLst>
             <a:ext uri="{909E8E84-426E-40dd-AFC4-6F175D3DCCD1}">
-              <a14:hiddenFill xmlns:a14="http://schemas.microsoft.com/office/drawing/2010/main" xmlns="">
+              <a14:hiddenFill xmlns="" xmlns:a14="http://schemas.microsoft.com/office/drawing/2010/main">
                 <a:solidFill>
                   <a:srgbClr val="FFFFFF"/>
                 </a:solidFill>
               </a14:hiddenFill>
             </a:ext>
             <a:ext uri="{91240B29-F687-4f45-9708-019B960494DF}">
-              <a14:hiddenLine xmlns:a14="http://schemas.microsoft.com/office/drawing/2010/main" xmlns="" w="9525">
+              <a14:hiddenLine xmlns="" xmlns:a14="http://schemas.microsoft.com/office/drawing/2010/main" w="9525">
                 <a:solidFill>
                   <a:srgbClr val="000000"/>
                 </a:solidFill>
@@ -26885,7 +26885,7 @@
           <a:graphicData uri="http://schemas.openxmlformats.org/presentationml/2006/ole">
             <mc:AlternateContent xmlns:mc="http://schemas.openxmlformats.org/markup-compatibility/2006">
               <mc:Choice xmlns:v="urn:schemas-microsoft-com:vml" Requires="v">
-                <p:oleObj spid="_x0000_s4183" name="Equation" r:id="rId3" imgW="2577960" imgH="457200" progId="Equation.DSMT4">
+                <p:oleObj spid="_x0000_s4185" name="Equation" r:id="rId3" imgW="2577960" imgH="457200" progId="Equation.DSMT4">
                   <p:embed/>
                 </p:oleObj>
               </mc:Choice>
@@ -26928,14 +26928,14 @@
                       <a:effectLst/>
                       <a:extLst>
                         <a:ext uri="{909E8E84-426E-40dd-AFC4-6F175D3DCCD1}">
-                          <a14:hiddenFill xmlns:a14="http://schemas.microsoft.com/office/drawing/2010/main" xmlns="">
+                          <a14:hiddenFill xmlns="" xmlns:a14="http://schemas.microsoft.com/office/drawing/2010/main">
                             <a:solidFill>
                               <a:srgbClr val="FFFFFF"/>
                             </a:solidFill>
                           </a14:hiddenFill>
                         </a:ext>
                         <a:ext uri="{91240B29-F687-4f45-9708-019B960494DF}">
-                          <a14:hiddenLine xmlns:a14="http://schemas.microsoft.com/office/drawing/2010/main" xmlns="" w="9525">
+                          <a14:hiddenLine xmlns="" xmlns:a14="http://schemas.microsoft.com/office/drawing/2010/main" w="9525">
                             <a:solidFill>
                               <a:srgbClr val="000000"/>
                             </a:solidFill>
@@ -26945,7 +26945,7 @@
                           </a14:hiddenLine>
                         </a:ext>
                         <a:ext uri="{AF507438-7753-43e0-B8FC-AC1667EBCBE1}">
-                          <a14:hiddenEffects xmlns:a14="http://schemas.microsoft.com/office/drawing/2010/main" xmlns="">
+                          <a14:hiddenEffects xmlns="" xmlns:a14="http://schemas.microsoft.com/office/drawing/2010/main">
                             <a:effectLst>
                               <a:outerShdw dist="35921" dir="2700000" algn="ctr" rotWithShape="0">
                                 <a:srgbClr val="808080"/>
@@ -30224,30 +30224,6 @@
           </a:p>
         </p:txBody>
       </p:sp>
-      <p:pic>
-        <p:nvPicPr>
-          <p:cNvPr id="2" name="Picture 1"/>
-          <p:cNvPicPr>
-            <a:picLocks noChangeAspect="1"/>
-          </p:cNvPicPr>
-          <p:nvPr/>
-        </p:nvPicPr>
-        <p:blipFill>
-          <a:blip r:embed="rId3"/>
-          <a:stretch>
-            <a:fillRect/>
-          </a:stretch>
-        </p:blipFill>
-        <p:spPr>
-          <a:xfrm>
-            <a:off x="5879951" y="1742782"/>
-            <a:ext cx="3032124" cy="2604966"/>
-          </a:xfrm>
-          <a:prstGeom prst="rect">
-            <a:avLst/>
-          </a:prstGeom>
-        </p:spPr>
-      </p:pic>
       <mc:AlternateContent xmlns:mc="http://schemas.openxmlformats.org/markup-compatibility/2006" xmlns:a14="http://schemas.microsoft.com/office/drawing/2010/main">
         <mc:Choice Requires="a14">
           <p:sp>
@@ -31136,6 +31112,680 @@
           </p:sp>
         </mc:Fallback>
       </mc:AlternateContent>
+      <p:grpSp>
+        <p:nvGrpSpPr>
+          <p:cNvPr id="13" name="Group 12">
+            <a:extLst>
+              <a:ext uri="{FF2B5EF4-FFF2-40B4-BE49-F238E27FC236}">
+                <a16:creationId xmlns:a16="http://schemas.microsoft.com/office/drawing/2014/main" id="{EB04EAAC-44B8-4E89-9EA9-EB781DB7B26D}"/>
+              </a:ext>
+            </a:extLst>
+          </p:cNvPr>
+          <p:cNvGrpSpPr/>
+          <p:nvPr/>
+        </p:nvGrpSpPr>
+        <p:grpSpPr>
+          <a:xfrm>
+            <a:off x="5683561" y="849765"/>
+            <a:ext cx="3229057" cy="3036435"/>
+            <a:chOff x="2335461" y="1846641"/>
+            <a:chExt cx="5015880" cy="4450219"/>
+          </a:xfrm>
+        </p:grpSpPr>
+        <p:sp>
+          <p:nvSpPr>
+            <p:cNvPr id="17" name="Shape 646">
+              <a:extLst>
+                <a:ext uri="{FF2B5EF4-FFF2-40B4-BE49-F238E27FC236}">
+                  <a16:creationId xmlns:a16="http://schemas.microsoft.com/office/drawing/2014/main" id="{454CDF1B-36A3-496B-877A-6804A6266DFD}"/>
+                </a:ext>
+              </a:extLst>
+            </p:cNvPr>
+            <p:cNvSpPr/>
+            <p:nvPr/>
+          </p:nvSpPr>
+          <p:spPr>
+            <a:xfrm>
+              <a:off x="2335461" y="2798535"/>
+              <a:ext cx="1828800" cy="1371600"/>
+            </a:xfrm>
+            <a:prstGeom prst="ellipse">
+              <a:avLst/>
+            </a:prstGeom>
+            <a:solidFill>
+              <a:srgbClr val="E6EEEE"/>
+            </a:solidFill>
+            <a:ln w="25400" cap="flat" cmpd="sng">
+              <a:solidFill>
+                <a:srgbClr val="667E7E"/>
+              </a:solidFill>
+              <a:prstDash val="solid"/>
+              <a:round/>
+              <a:headEnd type="none" w="sm" len="sm"/>
+              <a:tailEnd type="none" w="sm" len="sm"/>
+            </a:ln>
+          </p:spPr>
+          <p:txBody>
+            <a:bodyPr spcFirstLastPara="1" wrap="square" lIns="91425" tIns="45700" rIns="91425" bIns="45700" anchor="ctr" anchorCtr="0">
+              <a:noAutofit/>
+            </a:bodyPr>
+            <a:lstStyle/>
+            <a:p>
+              <a:pPr marL="0" marR="0" lvl="0" indent="0" algn="ctr" rtl="0">
+                <a:spcBef>
+                  <a:spcPts val="0"/>
+                </a:spcBef>
+                <a:spcAft>
+                  <a:spcPts val="0"/>
+                </a:spcAft>
+                <a:buNone/>
+              </a:pPr>
+              <a:r>
+                <a:rPr lang="nl-NL" sz="1050" b="1" dirty="0" err="1">
+                  <a:solidFill>
+                    <a:srgbClr val="3F3F3F"/>
+                  </a:solidFill>
+                  <a:latin typeface="Calibri"/>
+                  <a:ea typeface="Calibri"/>
+                  <a:cs typeface="Calibri"/>
+                  <a:sym typeface="Calibri"/>
+                </a:rPr>
+                <a:t>Healthy</a:t>
+              </a:r>
+              <a:r>
+                <a:rPr lang="nl-NL" sz="1050" b="1" dirty="0">
+                  <a:solidFill>
+                    <a:srgbClr val="3F3F3F"/>
+                  </a:solidFill>
+                  <a:latin typeface="Calibri"/>
+                  <a:ea typeface="Calibri"/>
+                  <a:cs typeface="Calibri"/>
+                  <a:sym typeface="Calibri"/>
+                </a:rPr>
+                <a:t> (H)</a:t>
+              </a:r>
+              <a:endParaRPr sz="1050" b="1" dirty="0">
+                <a:solidFill>
+                  <a:srgbClr val="3F3F3F"/>
+                </a:solidFill>
+                <a:latin typeface="Calibri"/>
+                <a:ea typeface="Calibri"/>
+                <a:cs typeface="Calibri"/>
+                <a:sym typeface="Calibri"/>
+              </a:endParaRPr>
+            </a:p>
+          </p:txBody>
+        </p:sp>
+        <p:sp>
+          <p:nvSpPr>
+            <p:cNvPr id="19" name="Shape 646">
+              <a:extLst>
+                <a:ext uri="{FF2B5EF4-FFF2-40B4-BE49-F238E27FC236}">
+                  <a16:creationId xmlns:a16="http://schemas.microsoft.com/office/drawing/2014/main" id="{E9483EC5-67F4-4A5B-998D-82C23948395C}"/>
+                </a:ext>
+              </a:extLst>
+            </p:cNvPr>
+            <p:cNvSpPr/>
+            <p:nvPr/>
+          </p:nvSpPr>
+          <p:spPr>
+            <a:xfrm>
+              <a:off x="5522541" y="2798535"/>
+              <a:ext cx="1828800" cy="1371600"/>
+            </a:xfrm>
+            <a:prstGeom prst="ellipse">
+              <a:avLst/>
+            </a:prstGeom>
+            <a:solidFill>
+              <a:srgbClr val="E6EEEE"/>
+            </a:solidFill>
+            <a:ln w="25400" cap="flat" cmpd="sng">
+              <a:solidFill>
+                <a:srgbClr val="667E7E"/>
+              </a:solidFill>
+              <a:prstDash val="solid"/>
+              <a:round/>
+              <a:headEnd type="none" w="sm" len="sm"/>
+              <a:tailEnd type="none" w="sm" len="sm"/>
+            </a:ln>
+          </p:spPr>
+          <p:txBody>
+            <a:bodyPr spcFirstLastPara="1" wrap="square" lIns="91425" tIns="45700" rIns="91425" bIns="45700" anchor="ctr" anchorCtr="0">
+              <a:noAutofit/>
+            </a:bodyPr>
+            <a:lstStyle/>
+            <a:p>
+              <a:pPr marL="0" marR="0" lvl="0" indent="0" algn="ctr" rtl="0">
+                <a:spcBef>
+                  <a:spcPts val="0"/>
+                </a:spcBef>
+                <a:spcAft>
+                  <a:spcPts val="0"/>
+                </a:spcAft>
+                <a:buNone/>
+              </a:pPr>
+              <a:r>
+                <a:rPr lang="nl-NL" sz="1050" b="1" dirty="0">
+                  <a:solidFill>
+                    <a:srgbClr val="3F3F3F"/>
+                  </a:solidFill>
+                  <a:latin typeface="Calibri"/>
+                  <a:ea typeface="Calibri"/>
+                  <a:cs typeface="Calibri"/>
+                  <a:sym typeface="Calibri"/>
+                </a:rPr>
+                <a:t>Sick (S)</a:t>
+              </a:r>
+              <a:endParaRPr sz="1050" b="1" dirty="0">
+                <a:solidFill>
+                  <a:srgbClr val="3F3F3F"/>
+                </a:solidFill>
+                <a:latin typeface="Calibri"/>
+                <a:ea typeface="Calibri"/>
+                <a:cs typeface="Calibri"/>
+                <a:sym typeface="Calibri"/>
+              </a:endParaRPr>
+            </a:p>
+          </p:txBody>
+        </p:sp>
+        <p:sp>
+          <p:nvSpPr>
+            <p:cNvPr id="20" name="Shape 646">
+              <a:extLst>
+                <a:ext uri="{FF2B5EF4-FFF2-40B4-BE49-F238E27FC236}">
+                  <a16:creationId xmlns:a16="http://schemas.microsoft.com/office/drawing/2014/main" id="{E8940966-C66A-4BB5-8BE1-DF7026A8E66D}"/>
+                </a:ext>
+              </a:extLst>
+            </p:cNvPr>
+            <p:cNvSpPr/>
+            <p:nvPr/>
+          </p:nvSpPr>
+          <p:spPr>
+            <a:xfrm>
+              <a:off x="3929001" y="4925260"/>
+              <a:ext cx="1828800" cy="1371600"/>
+            </a:xfrm>
+            <a:prstGeom prst="ellipse">
+              <a:avLst/>
+            </a:prstGeom>
+            <a:solidFill>
+              <a:srgbClr val="E6EEEE"/>
+            </a:solidFill>
+            <a:ln w="25400" cap="flat" cmpd="sng">
+              <a:solidFill>
+                <a:srgbClr val="667E7E"/>
+              </a:solidFill>
+              <a:prstDash val="solid"/>
+              <a:round/>
+              <a:headEnd type="none" w="sm" len="sm"/>
+              <a:tailEnd type="none" w="sm" len="sm"/>
+            </a:ln>
+          </p:spPr>
+          <p:txBody>
+            <a:bodyPr spcFirstLastPara="1" wrap="square" lIns="91425" tIns="45700" rIns="91425" bIns="45700" anchor="ctr" anchorCtr="0">
+              <a:noAutofit/>
+            </a:bodyPr>
+            <a:lstStyle/>
+            <a:p>
+              <a:pPr marL="0" marR="0" lvl="0" indent="0" algn="ctr" rtl="0">
+                <a:spcBef>
+                  <a:spcPts val="0"/>
+                </a:spcBef>
+                <a:spcAft>
+                  <a:spcPts val="0"/>
+                </a:spcAft>
+                <a:buNone/>
+              </a:pPr>
+              <a:r>
+                <a:rPr lang="nl-NL" sz="1050" b="1" dirty="0">
+                  <a:solidFill>
+                    <a:srgbClr val="3F3F3F"/>
+                  </a:solidFill>
+                  <a:latin typeface="Calibri"/>
+                  <a:ea typeface="Calibri"/>
+                  <a:cs typeface="Calibri"/>
+                  <a:sym typeface="Calibri"/>
+                </a:rPr>
+                <a:t>Dead</a:t>
+              </a:r>
+              <a:r>
+                <a:rPr lang="nl-NL" sz="1000" b="1" dirty="0">
+                  <a:solidFill>
+                    <a:srgbClr val="3F3F3F"/>
+                  </a:solidFill>
+                  <a:latin typeface="Calibri"/>
+                  <a:ea typeface="Calibri"/>
+                  <a:cs typeface="Calibri"/>
+                  <a:sym typeface="Calibri"/>
+                </a:rPr>
+                <a:t> (D)</a:t>
+              </a:r>
+              <a:endParaRPr sz="1000" b="1" dirty="0">
+                <a:solidFill>
+                  <a:srgbClr val="3F3F3F"/>
+                </a:solidFill>
+                <a:latin typeface="Calibri"/>
+                <a:ea typeface="Calibri"/>
+                <a:cs typeface="Calibri"/>
+                <a:sym typeface="Calibri"/>
+              </a:endParaRPr>
+            </a:p>
+          </p:txBody>
+        </p:sp>
+        <p:cxnSp>
+          <p:nvCxnSpPr>
+            <p:cNvPr id="21" name="Shape 651">
+              <a:extLst>
+                <a:ext uri="{FF2B5EF4-FFF2-40B4-BE49-F238E27FC236}">
+                  <a16:creationId xmlns:a16="http://schemas.microsoft.com/office/drawing/2014/main" id="{96F63303-02EA-4465-8224-FD55446055D2}"/>
+                </a:ext>
+              </a:extLst>
+            </p:cNvPr>
+            <p:cNvCxnSpPr>
+              <a:stCxn id="20" idx="0"/>
+              <a:endCxn id="23" idx="0"/>
+            </p:cNvCxnSpPr>
+            <p:nvPr/>
+          </p:nvCxnSpPr>
+          <p:spPr>
+            <a:xfrm rot="5400000" flipH="1" flipV="1">
+              <a:off x="4843401" y="1204995"/>
+              <a:ext cx="12700" cy="3187080"/>
+            </a:xfrm>
+            <a:prstGeom prst="curvedConnector3">
+              <a:avLst>
+                <a:gd name="adj1" fmla="val 4090906"/>
+              </a:avLst>
+            </a:prstGeom>
+            <a:noFill/>
+            <a:ln w="25400" cap="flat" cmpd="sng">
+              <a:solidFill>
+                <a:srgbClr val="3F3F3F"/>
+              </a:solidFill>
+              <a:prstDash val="solid"/>
+              <a:round/>
+              <a:headEnd type="none" w="sm" len="sm"/>
+              <a:tailEnd type="triangle" w="lg" len="lg"/>
+            </a:ln>
+          </p:spPr>
+        </p:cxnSp>
+        <p:cxnSp>
+          <p:nvCxnSpPr>
+            <p:cNvPr id="22" name="Shape 651">
+              <a:extLst>
+                <a:ext uri="{FF2B5EF4-FFF2-40B4-BE49-F238E27FC236}">
+                  <a16:creationId xmlns:a16="http://schemas.microsoft.com/office/drawing/2014/main" id="{8203223F-5850-4DF3-8DC9-D0F1B2F491DC}"/>
+                </a:ext>
+              </a:extLst>
+            </p:cNvPr>
+            <p:cNvCxnSpPr>
+              <a:stCxn id="20" idx="2"/>
+              <a:endCxn id="20" idx="1"/>
+            </p:cNvCxnSpPr>
+            <p:nvPr/>
+          </p:nvCxnSpPr>
+          <p:spPr>
+            <a:xfrm rot="10800000" flipH="1">
+              <a:off x="2335461" y="2999401"/>
+              <a:ext cx="267822" cy="484934"/>
+            </a:xfrm>
+            <a:prstGeom prst="curvedConnector4">
+              <a:avLst>
+                <a:gd name="adj1" fmla="val -85355"/>
+                <a:gd name="adj2" fmla="val 188562"/>
+              </a:avLst>
+            </a:prstGeom>
+            <a:noFill/>
+            <a:ln w="25400" cap="flat" cmpd="sng">
+              <a:solidFill>
+                <a:srgbClr val="3F3F3F"/>
+              </a:solidFill>
+              <a:prstDash val="solid"/>
+              <a:round/>
+              <a:headEnd type="none" w="sm" len="sm"/>
+              <a:tailEnd type="triangle" w="lg" len="lg"/>
+            </a:ln>
+          </p:spPr>
+        </p:cxnSp>
+        <p:cxnSp>
+          <p:nvCxnSpPr>
+            <p:cNvPr id="23" name="Shape 651">
+              <a:extLst>
+                <a:ext uri="{FF2B5EF4-FFF2-40B4-BE49-F238E27FC236}">
+                  <a16:creationId xmlns:a16="http://schemas.microsoft.com/office/drawing/2014/main" id="{6F337C90-2094-4C58-A1F8-231F12FC5995}"/>
+                </a:ext>
+              </a:extLst>
+            </p:cNvPr>
+            <p:cNvCxnSpPr>
+              <a:stCxn id="23" idx="6"/>
+              <a:endCxn id="23" idx="7"/>
+            </p:cNvCxnSpPr>
+            <p:nvPr/>
+          </p:nvCxnSpPr>
+          <p:spPr>
+            <a:xfrm flipH="1" flipV="1">
+              <a:off x="7083519" y="2999401"/>
+              <a:ext cx="267822" cy="484934"/>
+            </a:xfrm>
+            <a:prstGeom prst="curvedConnector4">
+              <a:avLst>
+                <a:gd name="adj1" fmla="val -85355"/>
+                <a:gd name="adj2" fmla="val 188562"/>
+              </a:avLst>
+            </a:prstGeom>
+            <a:noFill/>
+            <a:ln w="25400" cap="flat" cmpd="sng">
+              <a:solidFill>
+                <a:srgbClr val="3F3F3F"/>
+              </a:solidFill>
+              <a:prstDash val="solid"/>
+              <a:round/>
+              <a:headEnd type="none" w="sm" len="sm"/>
+              <a:tailEnd type="triangle" w="lg" len="lg"/>
+            </a:ln>
+          </p:spPr>
+        </p:cxnSp>
+        <p:cxnSp>
+          <p:nvCxnSpPr>
+            <p:cNvPr id="24" name="Shape 651">
+              <a:extLst>
+                <a:ext uri="{FF2B5EF4-FFF2-40B4-BE49-F238E27FC236}">
+                  <a16:creationId xmlns:a16="http://schemas.microsoft.com/office/drawing/2014/main" id="{73CCCBDC-DAB2-4B05-8BA7-E6D325C9138B}"/>
+                </a:ext>
+              </a:extLst>
+            </p:cNvPr>
+            <p:cNvCxnSpPr>
+              <a:stCxn id="24" idx="2"/>
+              <a:endCxn id="24" idx="3"/>
+            </p:cNvCxnSpPr>
+            <p:nvPr/>
+          </p:nvCxnSpPr>
+          <p:spPr>
+            <a:xfrm rot="10800000" flipH="1" flipV="1">
+              <a:off x="3929001" y="5611060"/>
+              <a:ext cx="267822" cy="484934"/>
+            </a:xfrm>
+            <a:prstGeom prst="curvedConnector4">
+              <a:avLst>
+                <a:gd name="adj1" fmla="val -85355"/>
+                <a:gd name="adj2" fmla="val 188562"/>
+              </a:avLst>
+            </a:prstGeom>
+            <a:noFill/>
+            <a:ln w="25400" cap="flat" cmpd="sng">
+              <a:solidFill>
+                <a:srgbClr val="3F3F3F"/>
+              </a:solidFill>
+              <a:prstDash val="solid"/>
+              <a:round/>
+              <a:headEnd type="none" w="sm" len="sm"/>
+              <a:tailEnd type="triangle" w="lg" len="lg"/>
+            </a:ln>
+          </p:spPr>
+        </p:cxnSp>
+        <p:cxnSp>
+          <p:nvCxnSpPr>
+            <p:cNvPr id="25" name="Shape 651">
+              <a:extLst>
+                <a:ext uri="{FF2B5EF4-FFF2-40B4-BE49-F238E27FC236}">
+                  <a16:creationId xmlns:a16="http://schemas.microsoft.com/office/drawing/2014/main" id="{665FE144-374A-49B3-B427-6D139453B328}"/>
+                </a:ext>
+              </a:extLst>
+            </p:cNvPr>
+            <p:cNvCxnSpPr>
+              <a:stCxn id="20" idx="4"/>
+              <a:endCxn id="24" idx="1"/>
+            </p:cNvCxnSpPr>
+            <p:nvPr/>
+          </p:nvCxnSpPr>
+          <p:spPr>
+            <a:xfrm>
+              <a:off x="3249861" y="4170135"/>
+              <a:ext cx="946962" cy="955991"/>
+            </a:xfrm>
+            <a:prstGeom prst="straightConnector1">
+              <a:avLst/>
+            </a:prstGeom>
+            <a:noFill/>
+            <a:ln w="25400" cap="flat" cmpd="sng">
+              <a:solidFill>
+                <a:srgbClr val="3F3F3F"/>
+              </a:solidFill>
+              <a:prstDash val="solid"/>
+              <a:round/>
+              <a:headEnd type="none" w="sm" len="sm"/>
+              <a:tailEnd type="triangle" w="lg" len="lg"/>
+            </a:ln>
+          </p:spPr>
+        </p:cxnSp>
+        <p:cxnSp>
+          <p:nvCxnSpPr>
+            <p:cNvPr id="26" name="Shape 651">
+              <a:extLst>
+                <a:ext uri="{FF2B5EF4-FFF2-40B4-BE49-F238E27FC236}">
+                  <a16:creationId xmlns:a16="http://schemas.microsoft.com/office/drawing/2014/main" id="{5D553D4D-00AA-43E0-A71B-BCE1025DCD6B}"/>
+                </a:ext>
+              </a:extLst>
+            </p:cNvPr>
+            <p:cNvCxnSpPr>
+              <a:stCxn id="23" idx="4"/>
+              <a:endCxn id="24" idx="7"/>
+            </p:cNvCxnSpPr>
+            <p:nvPr/>
+          </p:nvCxnSpPr>
+          <p:spPr>
+            <a:xfrm flipH="1">
+              <a:off x="5489979" y="4170135"/>
+              <a:ext cx="946962" cy="955991"/>
+            </a:xfrm>
+            <a:prstGeom prst="straightConnector1">
+              <a:avLst/>
+            </a:prstGeom>
+            <a:noFill/>
+            <a:ln w="25400" cap="flat" cmpd="sng">
+              <a:solidFill>
+                <a:srgbClr val="3F3F3F"/>
+              </a:solidFill>
+              <a:prstDash val="solid"/>
+              <a:round/>
+              <a:headEnd type="none" w="sm" len="sm"/>
+              <a:tailEnd type="triangle" w="lg" len="lg"/>
+            </a:ln>
+          </p:spPr>
+        </p:cxnSp>
+        <p:sp>
+          <p:nvSpPr>
+            <p:cNvPr id="27" name="Shape 671">
+              <a:extLst>
+                <a:ext uri="{FF2B5EF4-FFF2-40B4-BE49-F238E27FC236}">
+                  <a16:creationId xmlns:a16="http://schemas.microsoft.com/office/drawing/2014/main" id="{B5B696FD-B63F-4E6C-B2B5-9F8FA6141110}"/>
+                </a:ext>
+              </a:extLst>
+            </p:cNvPr>
+            <p:cNvSpPr txBox="1"/>
+            <p:nvPr/>
+          </p:nvSpPr>
+          <p:spPr>
+            <a:xfrm>
+              <a:off x="4425574" y="1846641"/>
+              <a:ext cx="835654" cy="306109"/>
+            </a:xfrm>
+            <a:prstGeom prst="rect">
+              <a:avLst/>
+            </a:prstGeom>
+            <a:noFill/>
+            <a:ln>
+              <a:noFill/>
+            </a:ln>
+          </p:spPr>
+          <p:txBody>
+            <a:bodyPr spcFirstLastPara="1" wrap="square" lIns="91425" tIns="45700" rIns="91425" bIns="45700" anchor="t" anchorCtr="0">
+              <a:noAutofit/>
+            </a:bodyPr>
+            <a:lstStyle/>
+            <a:p>
+              <a:pPr marL="0" marR="0" lvl="0" indent="0" algn="ctr" rtl="0">
+                <a:spcBef>
+                  <a:spcPts val="0"/>
+                </a:spcBef>
+                <a:spcAft>
+                  <a:spcPts val="0"/>
+                </a:spcAft>
+                <a:buNone/>
+              </a:pPr>
+              <a:r>
+                <a:rPr lang="nl-NL" sz="1200" dirty="0" err="1">
+                  <a:solidFill>
+                    <a:schemeClr val="dk1"/>
+                  </a:solidFill>
+                  <a:latin typeface="Calibri"/>
+                  <a:ea typeface="Calibri"/>
+                  <a:cs typeface="Calibri"/>
+                  <a:sym typeface="Calibri"/>
+                </a:rPr>
+                <a:t>p_HS</a:t>
+              </a:r>
+              <a:endParaRPr sz="1200" dirty="0">
+                <a:solidFill>
+                  <a:schemeClr val="dk1"/>
+                </a:solidFill>
+                <a:latin typeface="Calibri"/>
+                <a:ea typeface="Calibri"/>
+                <a:cs typeface="Calibri"/>
+                <a:sym typeface="Calibri"/>
+              </a:endParaRPr>
+            </a:p>
+          </p:txBody>
+        </p:sp>
+        <p:sp>
+          <p:nvSpPr>
+            <p:cNvPr id="28" name="Shape 671">
+              <a:extLst>
+                <a:ext uri="{FF2B5EF4-FFF2-40B4-BE49-F238E27FC236}">
+                  <a16:creationId xmlns:a16="http://schemas.microsoft.com/office/drawing/2014/main" id="{9A1AD756-B1F5-4C7C-A37C-E3185E80FD04}"/>
+                </a:ext>
+              </a:extLst>
+            </p:cNvPr>
+            <p:cNvSpPr txBox="1"/>
+            <p:nvPr/>
+          </p:nvSpPr>
+          <p:spPr>
+            <a:xfrm>
+              <a:off x="2925011" y="4601602"/>
+              <a:ext cx="835654" cy="306109"/>
+            </a:xfrm>
+            <a:prstGeom prst="rect">
+              <a:avLst/>
+            </a:prstGeom>
+            <a:noFill/>
+            <a:ln>
+              <a:noFill/>
+            </a:ln>
+          </p:spPr>
+          <p:txBody>
+            <a:bodyPr spcFirstLastPara="1" wrap="square" lIns="91425" tIns="45700" rIns="91425" bIns="45700" anchor="t" anchorCtr="0">
+              <a:noAutofit/>
+            </a:bodyPr>
+            <a:lstStyle/>
+            <a:p>
+              <a:pPr marL="0" marR="0" lvl="0" indent="0" algn="ctr" rtl="0">
+                <a:spcBef>
+                  <a:spcPts val="0"/>
+                </a:spcBef>
+                <a:spcAft>
+                  <a:spcPts val="0"/>
+                </a:spcAft>
+                <a:buNone/>
+              </a:pPr>
+              <a:r>
+                <a:rPr lang="nl-NL" sz="1200" dirty="0" err="1">
+                  <a:solidFill>
+                    <a:schemeClr val="dk1"/>
+                  </a:solidFill>
+                  <a:latin typeface="Calibri"/>
+                  <a:ea typeface="Calibri"/>
+                  <a:cs typeface="Calibri"/>
+                  <a:sym typeface="Calibri"/>
+                </a:rPr>
+                <a:t>p_HD</a:t>
+              </a:r>
+              <a:endParaRPr sz="1200" dirty="0">
+                <a:solidFill>
+                  <a:schemeClr val="dk1"/>
+                </a:solidFill>
+                <a:latin typeface="Calibri"/>
+                <a:ea typeface="Calibri"/>
+                <a:cs typeface="Calibri"/>
+                <a:sym typeface="Calibri"/>
+              </a:endParaRPr>
+            </a:p>
+          </p:txBody>
+        </p:sp>
+        <p:sp>
+          <p:nvSpPr>
+            <p:cNvPr id="29" name="Shape 671">
+              <a:extLst>
+                <a:ext uri="{FF2B5EF4-FFF2-40B4-BE49-F238E27FC236}">
+                  <a16:creationId xmlns:a16="http://schemas.microsoft.com/office/drawing/2014/main" id="{E0C2FD7C-8EF1-4BF6-B8F5-48D60FF2F68E}"/>
+                </a:ext>
+              </a:extLst>
+            </p:cNvPr>
+            <p:cNvSpPr txBox="1"/>
+            <p:nvPr/>
+          </p:nvSpPr>
+          <p:spPr>
+            <a:xfrm>
+              <a:off x="5807556" y="4619151"/>
+              <a:ext cx="835654" cy="306109"/>
+            </a:xfrm>
+            <a:prstGeom prst="rect">
+              <a:avLst/>
+            </a:prstGeom>
+            <a:noFill/>
+            <a:ln>
+              <a:noFill/>
+            </a:ln>
+          </p:spPr>
+          <p:txBody>
+            <a:bodyPr spcFirstLastPara="1" wrap="square" lIns="91425" tIns="45700" rIns="91425" bIns="45700" anchor="t" anchorCtr="0">
+              <a:noAutofit/>
+            </a:bodyPr>
+            <a:lstStyle/>
+            <a:p>
+              <a:pPr marL="0" marR="0" lvl="0" indent="0" algn="ctr" rtl="0">
+                <a:spcBef>
+                  <a:spcPts val="0"/>
+                </a:spcBef>
+                <a:spcAft>
+                  <a:spcPts val="0"/>
+                </a:spcAft>
+                <a:buNone/>
+              </a:pPr>
+              <a:r>
+                <a:rPr lang="nl-NL" sz="1200" dirty="0" err="1">
+                  <a:solidFill>
+                    <a:schemeClr val="dk1"/>
+                  </a:solidFill>
+                  <a:latin typeface="Calibri"/>
+                  <a:ea typeface="Calibri"/>
+                  <a:cs typeface="Calibri"/>
+                  <a:sym typeface="Calibri"/>
+                </a:rPr>
+                <a:t>p_SD</a:t>
+              </a:r>
+              <a:endParaRPr sz="1200" dirty="0">
+                <a:solidFill>
+                  <a:schemeClr val="dk1"/>
+                </a:solidFill>
+                <a:latin typeface="Calibri"/>
+                <a:ea typeface="Calibri"/>
+                <a:cs typeface="Calibri"/>
+                <a:sym typeface="Calibri"/>
+              </a:endParaRPr>
+            </a:p>
+          </p:txBody>
+        </p:sp>
+      </p:grpSp>
     </p:spTree>
     <p:extLst>
       <p:ext uri="{BB962C8B-B14F-4D97-AF65-F5344CB8AC3E}">

</xml_diff>